<commit_message>
20260116 10:55 WeeklyRecord20260116 commit
</commit_message>
<xml_diff>
--- a/里程碑.pptx
+++ b/里程碑.pptx
@@ -1,17 +1,17 @@
 
 <file path=ppt/presentation.xml><?xml version="1.0" encoding="utf-8"?>
-<p:presentation xmlns:a="http://schemas.openxmlformats.org/drawingml/2006/main" xmlns:r="http://schemas.openxmlformats.org/officeDocument/2006/relationships" xmlns:p="http://schemas.openxmlformats.org/presentationml/2006/main" saveSubsetFonts="1">
+<p:presentation xmlns:a="http://schemas.openxmlformats.org/drawingml/2006/main" xmlns:r="http://schemas.openxmlformats.org/officeDocument/2006/relationships" xmlns:p="http://schemas.openxmlformats.org/presentationml/2006/main">
   <p:sldMasterIdLst>
     <p:sldMasterId id="2147483648" r:id="rId1"/>
   </p:sldMasterIdLst>
   <p:sldIdLst>
-    <p:sldId id="256" r:id="rId2"/>
-    <p:sldId id="257" r:id="rId3"/>
+    <p:sldId id="256" r:id="rId3"/>
+    <p:sldId id="257" r:id="rId4"/>
   </p:sldIdLst>
   <p:sldSz cx="12192000" cy="6858000"/>
   <p:notesSz cx="6858000" cy="9144000"/>
   <p:custDataLst>
-    <p:tags r:id="rId4"/>
+    <p:tags r:id="rId8"/>
   </p:custDataLst>
   <p:defaultTextStyle>
     <a:defPPr>
@@ -108,11 +108,6 @@
       </a:defRPr>
     </a:lvl9pPr>
   </p:defaultTextStyle>
-  <p:extLst>
-    <p:ext uri="{EFAFB233-063F-42B5-8137-9DF3F51BA10A}">
-      <p15:sldGuideLst xmlns:p15="http://schemas.microsoft.com/office/powerpoint/2012/main"/>
-    </p:ext>
-  </p:extLst>
 </p:presentation>
 </file>
 
@@ -161,6 +156,7 @@
               <a:rPr lang="zh-CN" altLang="en-US"/>
               <a:t>单击此处编辑母版标题样式</a:t>
             </a:r>
+            <a:endParaRPr lang="zh-CN" altLang="en-US"/>
           </a:p>
         </p:txBody>
       </p:sp>
@@ -171,7 +167,7 @@
             <a:spLocks noGrp="1"/>
           </p:cNvSpPr>
           <p:nvPr>
-            <p:ph type="subTitle" idx="1"/>
+            <p:ph type="subTitle" idx="1" hasCustomPrompt="1"/>
           </p:nvPr>
         </p:nvSpPr>
         <p:spPr>
@@ -225,6 +221,7 @@
               <a:rPr lang="zh-CN" altLang="en-US"/>
               <a:t>单击以编辑母版副标题样式</a:t>
             </a:r>
+            <a:endParaRPr lang="zh-CN" altLang="en-US"/>
           </a:p>
         </p:txBody>
       </p:sp>
@@ -245,7 +242,6 @@
           <a:p>
             <a:fld id="{794720C1-931E-4518-B4DF-34ED1E2AFBE5}" type="datetimeFigureOut">
               <a:rPr lang="zh-CN" altLang="en-US" smtClean="0"/>
-              <a:t>2026/1/7</a:t>
             </a:fld>
             <a:endParaRPr lang="zh-CN" altLang="en-US"/>
           </a:p>
@@ -287,18 +283,12 @@
           <a:p>
             <a:fld id="{E2A52D76-9CB0-4157-B1C8-8BDFCAF5DAEF}" type="slidenum">
               <a:rPr lang="zh-CN" altLang="en-US" smtClean="0"/>
-              <a:t>‹#›</a:t>
             </a:fld>
             <a:endParaRPr lang="zh-CN" altLang="en-US"/>
           </a:p>
         </p:txBody>
       </p:sp>
     </p:spTree>
-    <p:extLst>
-      <p:ext uri="{BB962C8B-B14F-4D97-AF65-F5344CB8AC3E}">
-        <p14:creationId xmlns:p14="http://schemas.microsoft.com/office/powerpoint/2010/main" val="1049516373"/>
-      </p:ext>
-    </p:extLst>
   </p:cSld>
   <p:clrMapOvr>
     <a:masterClrMapping/>
@@ -342,6 +332,7 @@
               <a:rPr lang="zh-CN" altLang="en-US"/>
               <a:t>单击此处编辑母版标题样式</a:t>
             </a:r>
+            <a:endParaRPr lang="zh-CN" altLang="en-US"/>
           </a:p>
         </p:txBody>
       </p:sp>
@@ -352,7 +343,7 @@
             <a:spLocks noGrp="1"/>
           </p:cNvSpPr>
           <p:nvPr>
-            <p:ph type="body" orient="vert" idx="1"/>
+            <p:ph type="body" orient="vert" idx="1" hasCustomPrompt="1"/>
           </p:nvPr>
         </p:nvSpPr>
         <p:spPr/>
@@ -365,6 +356,7 @@
               <a:rPr lang="zh-CN" altLang="en-US"/>
               <a:t>编辑母版文本样式</a:t>
             </a:r>
+            <a:endParaRPr lang="zh-CN" altLang="en-US"/>
           </a:p>
           <a:p>
             <a:pPr lvl="1"/>
@@ -372,6 +364,7 @@
               <a:rPr lang="zh-CN" altLang="en-US"/>
               <a:t>第二级</a:t>
             </a:r>
+            <a:endParaRPr lang="zh-CN" altLang="en-US"/>
           </a:p>
           <a:p>
             <a:pPr lvl="2"/>
@@ -379,6 +372,7 @@
               <a:rPr lang="zh-CN" altLang="en-US"/>
               <a:t>第三级</a:t>
             </a:r>
+            <a:endParaRPr lang="zh-CN" altLang="en-US"/>
           </a:p>
           <a:p>
             <a:pPr lvl="3"/>
@@ -386,6 +380,7 @@
               <a:rPr lang="zh-CN" altLang="en-US"/>
               <a:t>第四级</a:t>
             </a:r>
+            <a:endParaRPr lang="zh-CN" altLang="en-US"/>
           </a:p>
           <a:p>
             <a:pPr lvl="4"/>
@@ -393,6 +388,7 @@
               <a:rPr lang="zh-CN" altLang="en-US"/>
               <a:t>第五级</a:t>
             </a:r>
+            <a:endParaRPr lang="zh-CN" altLang="en-US"/>
           </a:p>
         </p:txBody>
       </p:sp>
@@ -413,7 +409,6 @@
           <a:p>
             <a:fld id="{794720C1-931E-4518-B4DF-34ED1E2AFBE5}" type="datetimeFigureOut">
               <a:rPr lang="zh-CN" altLang="en-US" smtClean="0"/>
-              <a:t>2026/1/7</a:t>
             </a:fld>
             <a:endParaRPr lang="zh-CN" altLang="en-US"/>
           </a:p>
@@ -455,18 +450,12 @@
           <a:p>
             <a:fld id="{E2A52D76-9CB0-4157-B1C8-8BDFCAF5DAEF}" type="slidenum">
               <a:rPr lang="zh-CN" altLang="en-US" smtClean="0"/>
-              <a:t>‹#›</a:t>
             </a:fld>
             <a:endParaRPr lang="zh-CN" altLang="en-US"/>
           </a:p>
         </p:txBody>
       </p:sp>
     </p:spTree>
-    <p:extLst>
-      <p:ext uri="{BB962C8B-B14F-4D97-AF65-F5344CB8AC3E}">
-        <p14:creationId xmlns:p14="http://schemas.microsoft.com/office/powerpoint/2010/main" val="683906820"/>
-      </p:ext>
-    </p:extLst>
   </p:cSld>
   <p:clrMapOvr>
     <a:masterClrMapping/>
@@ -515,6 +504,7 @@
               <a:rPr lang="zh-CN" altLang="en-US"/>
               <a:t>单击此处编辑母版标题样式</a:t>
             </a:r>
+            <a:endParaRPr lang="zh-CN" altLang="en-US"/>
           </a:p>
         </p:txBody>
       </p:sp>
@@ -525,7 +515,7 @@
             <a:spLocks noGrp="1"/>
           </p:cNvSpPr>
           <p:nvPr>
-            <p:ph type="body" orient="vert" idx="1"/>
+            <p:ph type="body" orient="vert" idx="1" hasCustomPrompt="1"/>
           </p:nvPr>
         </p:nvSpPr>
         <p:spPr>
@@ -543,6 +533,7 @@
               <a:rPr lang="zh-CN" altLang="en-US"/>
               <a:t>编辑母版文本样式</a:t>
             </a:r>
+            <a:endParaRPr lang="zh-CN" altLang="en-US"/>
           </a:p>
           <a:p>
             <a:pPr lvl="1"/>
@@ -550,6 +541,7 @@
               <a:rPr lang="zh-CN" altLang="en-US"/>
               <a:t>第二级</a:t>
             </a:r>
+            <a:endParaRPr lang="zh-CN" altLang="en-US"/>
           </a:p>
           <a:p>
             <a:pPr lvl="2"/>
@@ -557,6 +549,7 @@
               <a:rPr lang="zh-CN" altLang="en-US"/>
               <a:t>第三级</a:t>
             </a:r>
+            <a:endParaRPr lang="zh-CN" altLang="en-US"/>
           </a:p>
           <a:p>
             <a:pPr lvl="3"/>
@@ -564,6 +557,7 @@
               <a:rPr lang="zh-CN" altLang="en-US"/>
               <a:t>第四级</a:t>
             </a:r>
+            <a:endParaRPr lang="zh-CN" altLang="en-US"/>
           </a:p>
           <a:p>
             <a:pPr lvl="4"/>
@@ -571,6 +565,7 @@
               <a:rPr lang="zh-CN" altLang="en-US"/>
               <a:t>第五级</a:t>
             </a:r>
+            <a:endParaRPr lang="zh-CN" altLang="en-US"/>
           </a:p>
         </p:txBody>
       </p:sp>
@@ -591,7 +586,6 @@
           <a:p>
             <a:fld id="{794720C1-931E-4518-B4DF-34ED1E2AFBE5}" type="datetimeFigureOut">
               <a:rPr lang="zh-CN" altLang="en-US" smtClean="0"/>
-              <a:t>2026/1/7</a:t>
             </a:fld>
             <a:endParaRPr lang="zh-CN" altLang="en-US"/>
           </a:p>
@@ -633,18 +627,12 @@
           <a:p>
             <a:fld id="{E2A52D76-9CB0-4157-B1C8-8BDFCAF5DAEF}" type="slidenum">
               <a:rPr lang="zh-CN" altLang="en-US" smtClean="0"/>
-              <a:t>‹#›</a:t>
             </a:fld>
             <a:endParaRPr lang="zh-CN" altLang="en-US"/>
           </a:p>
         </p:txBody>
       </p:sp>
     </p:spTree>
-    <p:extLst>
-      <p:ext uri="{BB962C8B-B14F-4D97-AF65-F5344CB8AC3E}">
-        <p14:creationId xmlns:p14="http://schemas.microsoft.com/office/powerpoint/2010/main" val="771642699"/>
-      </p:ext>
-    </p:extLst>
   </p:cSld>
   <p:clrMapOvr>
     <a:masterClrMapping/>
@@ -688,6 +676,7 @@
               <a:rPr lang="zh-CN" altLang="en-US"/>
               <a:t>单击此处编辑母版标题样式</a:t>
             </a:r>
+            <a:endParaRPr lang="zh-CN" altLang="en-US"/>
           </a:p>
         </p:txBody>
       </p:sp>
@@ -698,7 +687,7 @@
             <a:spLocks noGrp="1"/>
           </p:cNvSpPr>
           <p:nvPr>
-            <p:ph idx="1"/>
+            <p:ph idx="1" hasCustomPrompt="1"/>
           </p:nvPr>
         </p:nvSpPr>
         <p:spPr/>
@@ -711,6 +700,7 @@
               <a:rPr lang="zh-CN" altLang="en-US"/>
               <a:t>编辑母版文本样式</a:t>
             </a:r>
+            <a:endParaRPr lang="zh-CN" altLang="en-US"/>
           </a:p>
           <a:p>
             <a:pPr lvl="1"/>
@@ -718,6 +708,7 @@
               <a:rPr lang="zh-CN" altLang="en-US"/>
               <a:t>第二级</a:t>
             </a:r>
+            <a:endParaRPr lang="zh-CN" altLang="en-US"/>
           </a:p>
           <a:p>
             <a:pPr lvl="2"/>
@@ -725,6 +716,7 @@
               <a:rPr lang="zh-CN" altLang="en-US"/>
               <a:t>第三级</a:t>
             </a:r>
+            <a:endParaRPr lang="zh-CN" altLang="en-US"/>
           </a:p>
           <a:p>
             <a:pPr lvl="3"/>
@@ -732,6 +724,7 @@
               <a:rPr lang="zh-CN" altLang="en-US"/>
               <a:t>第四级</a:t>
             </a:r>
+            <a:endParaRPr lang="zh-CN" altLang="en-US"/>
           </a:p>
           <a:p>
             <a:pPr lvl="4"/>
@@ -739,6 +732,7 @@
               <a:rPr lang="zh-CN" altLang="en-US"/>
               <a:t>第五级</a:t>
             </a:r>
+            <a:endParaRPr lang="zh-CN" altLang="en-US"/>
           </a:p>
         </p:txBody>
       </p:sp>
@@ -759,7 +753,6 @@
           <a:p>
             <a:fld id="{794720C1-931E-4518-B4DF-34ED1E2AFBE5}" type="datetimeFigureOut">
               <a:rPr lang="zh-CN" altLang="en-US" smtClean="0"/>
-              <a:t>2026/1/7</a:t>
             </a:fld>
             <a:endParaRPr lang="zh-CN" altLang="en-US"/>
           </a:p>
@@ -801,18 +794,12 @@
           <a:p>
             <a:fld id="{E2A52D76-9CB0-4157-B1C8-8BDFCAF5DAEF}" type="slidenum">
               <a:rPr lang="zh-CN" altLang="en-US" smtClean="0"/>
-              <a:t>‹#›</a:t>
             </a:fld>
             <a:endParaRPr lang="zh-CN" altLang="en-US"/>
           </a:p>
         </p:txBody>
       </p:sp>
     </p:spTree>
-    <p:extLst>
-      <p:ext uri="{BB962C8B-B14F-4D97-AF65-F5344CB8AC3E}">
-        <p14:creationId xmlns:p14="http://schemas.microsoft.com/office/powerpoint/2010/main" val="4231110902"/>
-      </p:ext>
-    </p:extLst>
   </p:cSld>
   <p:clrMapOvr>
     <a:masterClrMapping/>
@@ -865,6 +852,7 @@
               <a:rPr lang="zh-CN" altLang="en-US"/>
               <a:t>单击此处编辑母版标题样式</a:t>
             </a:r>
+            <a:endParaRPr lang="zh-CN" altLang="en-US"/>
           </a:p>
         </p:txBody>
       </p:sp>
@@ -875,7 +863,7 @@
             <a:spLocks noGrp="1"/>
           </p:cNvSpPr>
           <p:nvPr>
-            <p:ph type="body" idx="1"/>
+            <p:ph type="body" idx="1" hasCustomPrompt="1"/>
           </p:nvPr>
         </p:nvSpPr>
         <p:spPr>
@@ -984,6 +972,7 @@
               <a:rPr lang="zh-CN" altLang="en-US"/>
               <a:t>编辑母版文本样式</a:t>
             </a:r>
+            <a:endParaRPr lang="zh-CN" altLang="en-US"/>
           </a:p>
         </p:txBody>
       </p:sp>
@@ -1004,7 +993,6 @@
           <a:p>
             <a:fld id="{794720C1-931E-4518-B4DF-34ED1E2AFBE5}" type="datetimeFigureOut">
               <a:rPr lang="zh-CN" altLang="en-US" smtClean="0"/>
-              <a:t>2026/1/7</a:t>
             </a:fld>
             <a:endParaRPr lang="zh-CN" altLang="en-US"/>
           </a:p>
@@ -1046,18 +1034,12 @@
           <a:p>
             <a:fld id="{E2A52D76-9CB0-4157-B1C8-8BDFCAF5DAEF}" type="slidenum">
               <a:rPr lang="zh-CN" altLang="en-US" smtClean="0"/>
-              <a:t>‹#›</a:t>
             </a:fld>
             <a:endParaRPr lang="zh-CN" altLang="en-US"/>
           </a:p>
         </p:txBody>
       </p:sp>
     </p:spTree>
-    <p:extLst>
-      <p:ext uri="{BB962C8B-B14F-4D97-AF65-F5344CB8AC3E}">
-        <p14:creationId xmlns:p14="http://schemas.microsoft.com/office/powerpoint/2010/main" val="3520211471"/>
-      </p:ext>
-    </p:extLst>
   </p:cSld>
   <p:clrMapOvr>
     <a:masterClrMapping/>
@@ -1101,6 +1083,7 @@
               <a:rPr lang="zh-CN" altLang="en-US"/>
               <a:t>单击此处编辑母版标题样式</a:t>
             </a:r>
+            <a:endParaRPr lang="zh-CN" altLang="en-US"/>
           </a:p>
         </p:txBody>
       </p:sp>
@@ -1111,7 +1094,7 @@
             <a:spLocks noGrp="1"/>
           </p:cNvSpPr>
           <p:nvPr>
-            <p:ph sz="half" idx="1"/>
+            <p:ph sz="half" idx="1" hasCustomPrompt="1"/>
           </p:nvPr>
         </p:nvSpPr>
         <p:spPr>
@@ -1129,6 +1112,7 @@
               <a:rPr lang="zh-CN" altLang="en-US"/>
               <a:t>编辑母版文本样式</a:t>
             </a:r>
+            <a:endParaRPr lang="zh-CN" altLang="en-US"/>
           </a:p>
           <a:p>
             <a:pPr lvl="1"/>
@@ -1136,6 +1120,7 @@
               <a:rPr lang="zh-CN" altLang="en-US"/>
               <a:t>第二级</a:t>
             </a:r>
+            <a:endParaRPr lang="zh-CN" altLang="en-US"/>
           </a:p>
           <a:p>
             <a:pPr lvl="2"/>
@@ -1143,6 +1128,7 @@
               <a:rPr lang="zh-CN" altLang="en-US"/>
               <a:t>第三级</a:t>
             </a:r>
+            <a:endParaRPr lang="zh-CN" altLang="en-US"/>
           </a:p>
           <a:p>
             <a:pPr lvl="3"/>
@@ -1150,6 +1136,7 @@
               <a:rPr lang="zh-CN" altLang="en-US"/>
               <a:t>第四级</a:t>
             </a:r>
+            <a:endParaRPr lang="zh-CN" altLang="en-US"/>
           </a:p>
           <a:p>
             <a:pPr lvl="4"/>
@@ -1157,6 +1144,7 @@
               <a:rPr lang="zh-CN" altLang="en-US"/>
               <a:t>第五级</a:t>
             </a:r>
+            <a:endParaRPr lang="zh-CN" altLang="en-US"/>
           </a:p>
         </p:txBody>
       </p:sp>
@@ -1167,7 +1155,7 @@
             <a:spLocks noGrp="1"/>
           </p:cNvSpPr>
           <p:nvPr>
-            <p:ph sz="half" idx="2"/>
+            <p:ph sz="half" idx="2" hasCustomPrompt="1"/>
           </p:nvPr>
         </p:nvSpPr>
         <p:spPr>
@@ -1185,6 +1173,7 @@
               <a:rPr lang="zh-CN" altLang="en-US"/>
               <a:t>编辑母版文本样式</a:t>
             </a:r>
+            <a:endParaRPr lang="zh-CN" altLang="en-US"/>
           </a:p>
           <a:p>
             <a:pPr lvl="1"/>
@@ -1192,6 +1181,7 @@
               <a:rPr lang="zh-CN" altLang="en-US"/>
               <a:t>第二级</a:t>
             </a:r>
+            <a:endParaRPr lang="zh-CN" altLang="en-US"/>
           </a:p>
           <a:p>
             <a:pPr lvl="2"/>
@@ -1199,6 +1189,7 @@
               <a:rPr lang="zh-CN" altLang="en-US"/>
               <a:t>第三级</a:t>
             </a:r>
+            <a:endParaRPr lang="zh-CN" altLang="en-US"/>
           </a:p>
           <a:p>
             <a:pPr lvl="3"/>
@@ -1206,6 +1197,7 @@
               <a:rPr lang="zh-CN" altLang="en-US"/>
               <a:t>第四级</a:t>
             </a:r>
+            <a:endParaRPr lang="zh-CN" altLang="en-US"/>
           </a:p>
           <a:p>
             <a:pPr lvl="4"/>
@@ -1213,6 +1205,7 @@
               <a:rPr lang="zh-CN" altLang="en-US"/>
               <a:t>第五级</a:t>
             </a:r>
+            <a:endParaRPr lang="zh-CN" altLang="en-US"/>
           </a:p>
         </p:txBody>
       </p:sp>
@@ -1233,7 +1226,6 @@
           <a:p>
             <a:fld id="{794720C1-931E-4518-B4DF-34ED1E2AFBE5}" type="datetimeFigureOut">
               <a:rPr lang="zh-CN" altLang="en-US" smtClean="0"/>
-              <a:t>2026/1/7</a:t>
             </a:fld>
             <a:endParaRPr lang="zh-CN" altLang="en-US"/>
           </a:p>
@@ -1275,18 +1267,12 @@
           <a:p>
             <a:fld id="{E2A52D76-9CB0-4157-B1C8-8BDFCAF5DAEF}" type="slidenum">
               <a:rPr lang="zh-CN" altLang="en-US" smtClean="0"/>
-              <a:t>‹#›</a:t>
             </a:fld>
             <a:endParaRPr lang="zh-CN" altLang="en-US"/>
           </a:p>
         </p:txBody>
       </p:sp>
     </p:spTree>
-    <p:extLst>
-      <p:ext uri="{BB962C8B-B14F-4D97-AF65-F5344CB8AC3E}">
-        <p14:creationId xmlns:p14="http://schemas.microsoft.com/office/powerpoint/2010/main" val="1798228164"/>
-      </p:ext>
-    </p:extLst>
   </p:cSld>
   <p:clrMapOvr>
     <a:masterClrMapping/>
@@ -1335,6 +1321,7 @@
               <a:rPr lang="zh-CN" altLang="en-US"/>
               <a:t>单击此处编辑母版标题样式</a:t>
             </a:r>
+            <a:endParaRPr lang="zh-CN" altLang="en-US"/>
           </a:p>
         </p:txBody>
       </p:sp>
@@ -1345,7 +1332,7 @@
             <a:spLocks noGrp="1"/>
           </p:cNvSpPr>
           <p:nvPr>
-            <p:ph type="body" idx="1"/>
+            <p:ph type="body" idx="1" hasCustomPrompt="1"/>
           </p:nvPr>
         </p:nvSpPr>
         <p:spPr>
@@ -1400,6 +1387,7 @@
               <a:rPr lang="zh-CN" altLang="en-US"/>
               <a:t>编辑母版文本样式</a:t>
             </a:r>
+            <a:endParaRPr lang="zh-CN" altLang="en-US"/>
           </a:p>
         </p:txBody>
       </p:sp>
@@ -1410,7 +1398,7 @@
             <a:spLocks noGrp="1"/>
           </p:cNvSpPr>
           <p:nvPr>
-            <p:ph sz="half" idx="2"/>
+            <p:ph sz="half" idx="2" hasCustomPrompt="1"/>
           </p:nvPr>
         </p:nvSpPr>
         <p:spPr>
@@ -1428,6 +1416,7 @@
               <a:rPr lang="zh-CN" altLang="en-US"/>
               <a:t>编辑母版文本样式</a:t>
             </a:r>
+            <a:endParaRPr lang="zh-CN" altLang="en-US"/>
           </a:p>
           <a:p>
             <a:pPr lvl="1"/>
@@ -1435,6 +1424,7 @@
               <a:rPr lang="zh-CN" altLang="en-US"/>
               <a:t>第二级</a:t>
             </a:r>
+            <a:endParaRPr lang="zh-CN" altLang="en-US"/>
           </a:p>
           <a:p>
             <a:pPr lvl="2"/>
@@ -1442,6 +1432,7 @@
               <a:rPr lang="zh-CN" altLang="en-US"/>
               <a:t>第三级</a:t>
             </a:r>
+            <a:endParaRPr lang="zh-CN" altLang="en-US"/>
           </a:p>
           <a:p>
             <a:pPr lvl="3"/>
@@ -1449,6 +1440,7 @@
               <a:rPr lang="zh-CN" altLang="en-US"/>
               <a:t>第四级</a:t>
             </a:r>
+            <a:endParaRPr lang="zh-CN" altLang="en-US"/>
           </a:p>
           <a:p>
             <a:pPr lvl="4"/>
@@ -1456,6 +1448,7 @@
               <a:rPr lang="zh-CN" altLang="en-US"/>
               <a:t>第五级</a:t>
             </a:r>
+            <a:endParaRPr lang="zh-CN" altLang="en-US"/>
           </a:p>
         </p:txBody>
       </p:sp>
@@ -1466,7 +1459,7 @@
             <a:spLocks noGrp="1"/>
           </p:cNvSpPr>
           <p:nvPr>
-            <p:ph type="body" sz="quarter" idx="3"/>
+            <p:ph type="body" sz="quarter" idx="3" hasCustomPrompt="1"/>
           </p:nvPr>
         </p:nvSpPr>
         <p:spPr>
@@ -1521,6 +1514,7 @@
               <a:rPr lang="zh-CN" altLang="en-US"/>
               <a:t>编辑母版文本样式</a:t>
             </a:r>
+            <a:endParaRPr lang="zh-CN" altLang="en-US"/>
           </a:p>
         </p:txBody>
       </p:sp>
@@ -1531,7 +1525,7 @@
             <a:spLocks noGrp="1"/>
           </p:cNvSpPr>
           <p:nvPr>
-            <p:ph sz="quarter" idx="4"/>
+            <p:ph sz="quarter" idx="4" hasCustomPrompt="1"/>
           </p:nvPr>
         </p:nvSpPr>
         <p:spPr>
@@ -1549,6 +1543,7 @@
               <a:rPr lang="zh-CN" altLang="en-US"/>
               <a:t>编辑母版文本样式</a:t>
             </a:r>
+            <a:endParaRPr lang="zh-CN" altLang="en-US"/>
           </a:p>
           <a:p>
             <a:pPr lvl="1"/>
@@ -1556,6 +1551,7 @@
               <a:rPr lang="zh-CN" altLang="en-US"/>
               <a:t>第二级</a:t>
             </a:r>
+            <a:endParaRPr lang="zh-CN" altLang="en-US"/>
           </a:p>
           <a:p>
             <a:pPr lvl="2"/>
@@ -1563,6 +1559,7 @@
               <a:rPr lang="zh-CN" altLang="en-US"/>
               <a:t>第三级</a:t>
             </a:r>
+            <a:endParaRPr lang="zh-CN" altLang="en-US"/>
           </a:p>
           <a:p>
             <a:pPr lvl="3"/>
@@ -1570,6 +1567,7 @@
               <a:rPr lang="zh-CN" altLang="en-US"/>
               <a:t>第四级</a:t>
             </a:r>
+            <a:endParaRPr lang="zh-CN" altLang="en-US"/>
           </a:p>
           <a:p>
             <a:pPr lvl="4"/>
@@ -1577,6 +1575,7 @@
               <a:rPr lang="zh-CN" altLang="en-US"/>
               <a:t>第五级</a:t>
             </a:r>
+            <a:endParaRPr lang="zh-CN" altLang="en-US"/>
           </a:p>
         </p:txBody>
       </p:sp>
@@ -1597,7 +1596,6 @@
           <a:p>
             <a:fld id="{794720C1-931E-4518-B4DF-34ED1E2AFBE5}" type="datetimeFigureOut">
               <a:rPr lang="zh-CN" altLang="en-US" smtClean="0"/>
-              <a:t>2026/1/7</a:t>
             </a:fld>
             <a:endParaRPr lang="zh-CN" altLang="en-US"/>
           </a:p>
@@ -1639,18 +1637,12 @@
           <a:p>
             <a:fld id="{E2A52D76-9CB0-4157-B1C8-8BDFCAF5DAEF}" type="slidenum">
               <a:rPr lang="zh-CN" altLang="en-US" smtClean="0"/>
-              <a:t>‹#›</a:t>
             </a:fld>
             <a:endParaRPr lang="zh-CN" altLang="en-US"/>
           </a:p>
         </p:txBody>
       </p:sp>
     </p:spTree>
-    <p:extLst>
-      <p:ext uri="{BB962C8B-B14F-4D97-AF65-F5344CB8AC3E}">
-        <p14:creationId xmlns:p14="http://schemas.microsoft.com/office/powerpoint/2010/main" val="789772463"/>
-      </p:ext>
-    </p:extLst>
   </p:cSld>
   <p:clrMapOvr>
     <a:masterClrMapping/>
@@ -1694,6 +1686,7 @@
               <a:rPr lang="zh-CN" altLang="en-US"/>
               <a:t>单击此处编辑母版标题样式</a:t>
             </a:r>
+            <a:endParaRPr lang="zh-CN" altLang="en-US"/>
           </a:p>
         </p:txBody>
       </p:sp>
@@ -1714,7 +1707,6 @@
           <a:p>
             <a:fld id="{794720C1-931E-4518-B4DF-34ED1E2AFBE5}" type="datetimeFigureOut">
               <a:rPr lang="zh-CN" altLang="en-US" smtClean="0"/>
-              <a:t>2026/1/7</a:t>
             </a:fld>
             <a:endParaRPr lang="zh-CN" altLang="en-US"/>
           </a:p>
@@ -1756,18 +1748,12 @@
           <a:p>
             <a:fld id="{E2A52D76-9CB0-4157-B1C8-8BDFCAF5DAEF}" type="slidenum">
               <a:rPr lang="zh-CN" altLang="en-US" smtClean="0"/>
-              <a:t>‹#›</a:t>
             </a:fld>
             <a:endParaRPr lang="zh-CN" altLang="en-US"/>
           </a:p>
         </p:txBody>
       </p:sp>
     </p:spTree>
-    <p:extLst>
-      <p:ext uri="{BB962C8B-B14F-4D97-AF65-F5344CB8AC3E}">
-        <p14:creationId xmlns:p14="http://schemas.microsoft.com/office/powerpoint/2010/main" val="2344284054"/>
-      </p:ext>
-    </p:extLst>
   </p:cSld>
   <p:clrMapOvr>
     <a:masterClrMapping/>
@@ -1809,7 +1795,6 @@
           <a:p>
             <a:fld id="{794720C1-931E-4518-B4DF-34ED1E2AFBE5}" type="datetimeFigureOut">
               <a:rPr lang="zh-CN" altLang="en-US" smtClean="0"/>
-              <a:t>2026/1/7</a:t>
             </a:fld>
             <a:endParaRPr lang="zh-CN" altLang="en-US"/>
           </a:p>
@@ -1851,18 +1836,12 @@
           <a:p>
             <a:fld id="{E2A52D76-9CB0-4157-B1C8-8BDFCAF5DAEF}" type="slidenum">
               <a:rPr lang="zh-CN" altLang="en-US" smtClean="0"/>
-              <a:t>‹#›</a:t>
             </a:fld>
             <a:endParaRPr lang="zh-CN" altLang="en-US"/>
           </a:p>
         </p:txBody>
       </p:sp>
     </p:spTree>
-    <p:extLst>
-      <p:ext uri="{BB962C8B-B14F-4D97-AF65-F5344CB8AC3E}">
-        <p14:creationId xmlns:p14="http://schemas.microsoft.com/office/powerpoint/2010/main" val="4073970791"/>
-      </p:ext>
-    </p:extLst>
   </p:cSld>
   <p:clrMapOvr>
     <a:masterClrMapping/>
@@ -1915,6 +1894,7 @@
               <a:rPr lang="zh-CN" altLang="en-US"/>
               <a:t>单击此处编辑母版标题样式</a:t>
             </a:r>
+            <a:endParaRPr lang="zh-CN" altLang="en-US"/>
           </a:p>
         </p:txBody>
       </p:sp>
@@ -1925,7 +1905,7 @@
             <a:spLocks noGrp="1"/>
           </p:cNvSpPr>
           <p:nvPr>
-            <p:ph idx="1"/>
+            <p:ph idx="1" hasCustomPrompt="1"/>
           </p:nvPr>
         </p:nvSpPr>
         <p:spPr>
@@ -1971,6 +1951,7 @@
               <a:rPr lang="zh-CN" altLang="en-US"/>
               <a:t>编辑母版文本样式</a:t>
             </a:r>
+            <a:endParaRPr lang="zh-CN" altLang="en-US"/>
           </a:p>
           <a:p>
             <a:pPr lvl="1"/>
@@ -1978,6 +1959,7 @@
               <a:rPr lang="zh-CN" altLang="en-US"/>
               <a:t>第二级</a:t>
             </a:r>
+            <a:endParaRPr lang="zh-CN" altLang="en-US"/>
           </a:p>
           <a:p>
             <a:pPr lvl="2"/>
@@ -1985,6 +1967,7 @@
               <a:rPr lang="zh-CN" altLang="en-US"/>
               <a:t>第三级</a:t>
             </a:r>
+            <a:endParaRPr lang="zh-CN" altLang="en-US"/>
           </a:p>
           <a:p>
             <a:pPr lvl="3"/>
@@ -1992,6 +1975,7 @@
               <a:rPr lang="zh-CN" altLang="en-US"/>
               <a:t>第四级</a:t>
             </a:r>
+            <a:endParaRPr lang="zh-CN" altLang="en-US"/>
           </a:p>
           <a:p>
             <a:pPr lvl="4"/>
@@ -1999,6 +1983,7 @@
               <a:rPr lang="zh-CN" altLang="en-US"/>
               <a:t>第五级</a:t>
             </a:r>
+            <a:endParaRPr lang="zh-CN" altLang="en-US"/>
           </a:p>
         </p:txBody>
       </p:sp>
@@ -2009,7 +1994,7 @@
             <a:spLocks noGrp="1"/>
           </p:cNvSpPr>
           <p:nvPr>
-            <p:ph type="body" sz="half" idx="2"/>
+            <p:ph type="body" sz="half" idx="2" hasCustomPrompt="1"/>
           </p:nvPr>
         </p:nvSpPr>
         <p:spPr>
@@ -2064,6 +2049,7 @@
               <a:rPr lang="zh-CN" altLang="en-US"/>
               <a:t>编辑母版文本样式</a:t>
             </a:r>
+            <a:endParaRPr lang="zh-CN" altLang="en-US"/>
           </a:p>
         </p:txBody>
       </p:sp>
@@ -2084,7 +2070,6 @@
           <a:p>
             <a:fld id="{794720C1-931E-4518-B4DF-34ED1E2AFBE5}" type="datetimeFigureOut">
               <a:rPr lang="zh-CN" altLang="en-US" smtClean="0"/>
-              <a:t>2026/1/7</a:t>
             </a:fld>
             <a:endParaRPr lang="zh-CN" altLang="en-US"/>
           </a:p>
@@ -2126,18 +2111,12 @@
           <a:p>
             <a:fld id="{E2A52D76-9CB0-4157-B1C8-8BDFCAF5DAEF}" type="slidenum">
               <a:rPr lang="zh-CN" altLang="en-US" smtClean="0"/>
-              <a:t>‹#›</a:t>
             </a:fld>
             <a:endParaRPr lang="zh-CN" altLang="en-US"/>
           </a:p>
         </p:txBody>
       </p:sp>
     </p:spTree>
-    <p:extLst>
-      <p:ext uri="{BB962C8B-B14F-4D97-AF65-F5344CB8AC3E}">
-        <p14:creationId xmlns:p14="http://schemas.microsoft.com/office/powerpoint/2010/main" val="2465638236"/>
-      </p:ext>
-    </p:extLst>
   </p:cSld>
   <p:clrMapOvr>
     <a:masterClrMapping/>
@@ -2190,6 +2169,7 @@
               <a:rPr lang="zh-CN" altLang="en-US"/>
               <a:t>单击此处编辑母版标题样式</a:t>
             </a:r>
+            <a:endParaRPr lang="zh-CN" altLang="en-US"/>
           </a:p>
         </p:txBody>
       </p:sp>
@@ -2261,7 +2241,7 @@
             <a:spLocks noGrp="1"/>
           </p:cNvSpPr>
           <p:nvPr>
-            <p:ph type="body" sz="half" idx="2"/>
+            <p:ph type="body" sz="half" idx="2" hasCustomPrompt="1"/>
           </p:nvPr>
         </p:nvSpPr>
         <p:spPr>
@@ -2316,6 +2296,7 @@
               <a:rPr lang="zh-CN" altLang="en-US"/>
               <a:t>编辑母版文本样式</a:t>
             </a:r>
+            <a:endParaRPr lang="zh-CN" altLang="en-US"/>
           </a:p>
         </p:txBody>
       </p:sp>
@@ -2336,7 +2317,6 @@
           <a:p>
             <a:fld id="{794720C1-931E-4518-B4DF-34ED1E2AFBE5}" type="datetimeFigureOut">
               <a:rPr lang="zh-CN" altLang="en-US" smtClean="0"/>
-              <a:t>2026/1/7</a:t>
             </a:fld>
             <a:endParaRPr lang="zh-CN" altLang="en-US"/>
           </a:p>
@@ -2378,18 +2358,12 @@
           <a:p>
             <a:fld id="{E2A52D76-9CB0-4157-B1C8-8BDFCAF5DAEF}" type="slidenum">
               <a:rPr lang="zh-CN" altLang="en-US" smtClean="0"/>
-              <a:t>‹#›</a:t>
             </a:fld>
             <a:endParaRPr lang="zh-CN" altLang="en-US"/>
           </a:p>
         </p:txBody>
       </p:sp>
     </p:spTree>
-    <p:extLst>
-      <p:ext uri="{BB962C8B-B14F-4D97-AF65-F5344CB8AC3E}">
-        <p14:creationId xmlns:p14="http://schemas.microsoft.com/office/powerpoint/2010/main" val="652824257"/>
-      </p:ext>
-    </p:extLst>
   </p:cSld>
   <p:clrMapOvr>
     <a:masterClrMapping/>
@@ -2448,6 +2422,7 @@
               <a:rPr lang="zh-CN" altLang="en-US"/>
               <a:t>单击此处编辑母版标题样式</a:t>
             </a:r>
+            <a:endParaRPr lang="zh-CN" altLang="en-US"/>
           </a:p>
         </p:txBody>
       </p:sp>
@@ -2481,6 +2456,7 @@
               <a:rPr lang="zh-CN" altLang="en-US"/>
               <a:t>编辑母版文本样式</a:t>
             </a:r>
+            <a:endParaRPr lang="zh-CN" altLang="en-US"/>
           </a:p>
           <a:p>
             <a:pPr lvl="1"/>
@@ -2488,6 +2464,7 @@
               <a:rPr lang="zh-CN" altLang="en-US"/>
               <a:t>第二级</a:t>
             </a:r>
+            <a:endParaRPr lang="zh-CN" altLang="en-US"/>
           </a:p>
           <a:p>
             <a:pPr lvl="2"/>
@@ -2495,6 +2472,7 @@
               <a:rPr lang="zh-CN" altLang="en-US"/>
               <a:t>第三级</a:t>
             </a:r>
+            <a:endParaRPr lang="zh-CN" altLang="en-US"/>
           </a:p>
           <a:p>
             <a:pPr lvl="3"/>
@@ -2502,6 +2480,7 @@
               <a:rPr lang="zh-CN" altLang="en-US"/>
               <a:t>第四级</a:t>
             </a:r>
+            <a:endParaRPr lang="zh-CN" altLang="en-US"/>
           </a:p>
           <a:p>
             <a:pPr lvl="4"/>
@@ -2509,6 +2488,7 @@
               <a:rPr lang="zh-CN" altLang="en-US"/>
               <a:t>第五级</a:t>
             </a:r>
+            <a:endParaRPr lang="zh-CN" altLang="en-US"/>
           </a:p>
         </p:txBody>
       </p:sp>
@@ -2547,7 +2527,6 @@
           <a:p>
             <a:fld id="{794720C1-931E-4518-B4DF-34ED1E2AFBE5}" type="datetimeFigureOut">
               <a:rPr lang="zh-CN" altLang="en-US" smtClean="0"/>
-              <a:t>2026/1/7</a:t>
             </a:fld>
             <a:endParaRPr lang="zh-CN" altLang="en-US"/>
           </a:p>
@@ -2625,18 +2604,12 @@
           <a:p>
             <a:fld id="{E2A52D76-9CB0-4157-B1C8-8BDFCAF5DAEF}" type="slidenum">
               <a:rPr lang="zh-CN" altLang="en-US" smtClean="0"/>
-              <a:t>‹#›</a:t>
             </a:fld>
             <a:endParaRPr lang="zh-CN" altLang="en-US"/>
           </a:p>
         </p:txBody>
       </p:sp>
     </p:spTree>
-    <p:extLst>
-      <p:ext uri="{BB962C8B-B14F-4D97-AF65-F5344CB8AC3E}">
-        <p14:creationId xmlns:p14="http://schemas.microsoft.com/office/powerpoint/2010/main" val="3034157737"/>
-      </p:ext>
-    </p:extLst>
   </p:cSld>
   <p:clrMap bg1="lt1" tx1="dk1" bg2="lt2" tx2="dk2" accent1="accent1" accent2="accent2" accent3="accent3" accent4="accent4" accent5="accent5" accent6="accent6" hlink="hlink" folHlink="folHlink"/>
   <p:sldLayoutIdLst>
@@ -3058,6 +3031,7 @@
               <a:rPr lang="zh-CN" altLang="en-US" dirty="0"/>
               <a:t>开题报告</a:t>
             </a:r>
+            <a:endParaRPr lang="zh-CN" altLang="en-US" dirty="0"/>
           </a:p>
         </p:txBody>
       </p:sp>
@@ -3096,6 +3070,7 @@
               <a:rPr lang="zh-CN" altLang="en-US" dirty="0"/>
               <a:t>中期检查</a:t>
             </a:r>
+            <a:endParaRPr lang="zh-CN" altLang="en-US" dirty="0"/>
           </a:p>
         </p:txBody>
       </p:sp>
@@ -3169,15 +3144,14 @@
               <a:rPr lang="zh-CN" altLang="en-US" dirty="0"/>
               <a:t>毕业答辩</a:t>
             </a:r>
+            <a:endParaRPr lang="zh-CN" altLang="en-US" dirty="0"/>
           </a:p>
         </p:txBody>
       </p:sp>
       <p:cxnSp>
         <p:nvCxnSpPr>
           <p:cNvPr id="12" name="直接连接符 11"/>
-          <p:cNvCxnSpPr>
-            <a:cxnSpLocks/>
-          </p:cNvCxnSpPr>
+          <p:cNvCxnSpPr/>
           <p:nvPr/>
         </p:nvCxnSpPr>
         <p:spPr>
@@ -3241,7 +3215,6 @@
         <p:nvCxnSpPr>
           <p:cNvPr id="16" name="直接连接符 15"/>
           <p:cNvCxnSpPr>
-            <a:cxnSpLocks/>
             <a:stCxn id="7" idx="3"/>
           </p:cNvCxnSpPr>
           <p:nvPr/>
@@ -3273,9 +3246,7 @@
       <p:cxnSp>
         <p:nvCxnSpPr>
           <p:cNvPr id="18" name="直接箭头连接符 17"/>
-          <p:cNvCxnSpPr>
-            <a:cxnSpLocks/>
-          </p:cNvCxnSpPr>
+          <p:cNvCxnSpPr/>
           <p:nvPr/>
         </p:nvCxnSpPr>
         <p:spPr>
@@ -3309,7 +3280,6 @@
         <p:nvCxnSpPr>
           <p:cNvPr id="20" name="直接连接符 19"/>
           <p:cNvCxnSpPr>
-            <a:cxnSpLocks/>
             <a:stCxn id="9" idx="3"/>
           </p:cNvCxnSpPr>
           <p:nvPr/>
@@ -3440,7 +3410,6 @@
         <p:nvCxnSpPr>
           <p:cNvPr id="29" name="直接连接符 28"/>
           <p:cNvCxnSpPr>
-            <a:cxnSpLocks/>
             <a:stCxn id="8" idx="3"/>
           </p:cNvCxnSpPr>
           <p:nvPr/>
@@ -3472,9 +3441,7 @@
       <p:cxnSp>
         <p:nvCxnSpPr>
           <p:cNvPr id="31" name="直接箭头连接符 30"/>
-          <p:cNvCxnSpPr>
-            <a:cxnSpLocks/>
-          </p:cNvCxnSpPr>
+          <p:cNvCxnSpPr/>
           <p:nvPr/>
         </p:nvCxnSpPr>
         <p:spPr>
@@ -4087,11 +4054,6 @@
         </p:txBody>
       </p:sp>
     </p:spTree>
-    <p:extLst>
-      <p:ext uri="{BB962C8B-B14F-4D97-AF65-F5344CB8AC3E}">
-        <p14:creationId xmlns:p14="http://schemas.microsoft.com/office/powerpoint/2010/main" val="1105998159"/>
-      </p:ext>
-    </p:extLst>
   </p:cSld>
   <p:clrMapOvr>
     <a:masterClrMapping/>
@@ -4118,13 +4080,7 @@
       </p:grpSpPr>
       <p:grpSp>
         <p:nvGrpSpPr>
-          <p:cNvPr id="10" name="组合 9">
-            <a:extLst>
-              <a:ext uri="{FF2B5EF4-FFF2-40B4-BE49-F238E27FC236}">
-                <a16:creationId xmlns:a16="http://schemas.microsoft.com/office/drawing/2014/main" id="{487BA8E4-C9D8-416E-9211-7AEC1182013E}"/>
-              </a:ext>
-            </a:extLst>
-          </p:cNvPr>
+          <p:cNvPr id="10" name="组合 9"/>
           <p:cNvGrpSpPr/>
           <p:nvPr/>
         </p:nvGrpSpPr>
@@ -4138,20 +4094,14 @@
         </p:grpSpPr>
         <p:pic>
           <p:nvPicPr>
-            <p:cNvPr id="5" name="图片 4">
-              <a:extLst>
-                <a:ext uri="{FF2B5EF4-FFF2-40B4-BE49-F238E27FC236}">
-                  <a16:creationId xmlns:a16="http://schemas.microsoft.com/office/drawing/2014/main" id="{2F20ABAA-08D8-4C59-ACC3-F18FAA32342A}"/>
-                </a:ext>
-              </a:extLst>
-            </p:cNvPr>
+            <p:cNvPr id="5" name="图片 4"/>
             <p:cNvPicPr>
               <a:picLocks noChangeAspect="1"/>
             </p:cNvPicPr>
             <p:nvPr/>
           </p:nvPicPr>
           <p:blipFill>
-            <a:blip r:embed="rId2">
+            <a:blip r:embed="rId1">
               <a:extLst>
                 <a:ext uri="{28A0092B-C50C-407E-A947-70E740481C1C}">
                   <a14:useLocalDpi xmlns:a14="http://schemas.microsoft.com/office/drawing/2010/main" val="0"/>
@@ -4174,52 +4124,47 @@
         </p:pic>
         <p:grpSp>
           <p:nvGrpSpPr>
-            <p:cNvPr id="9" name="组合 8">
-              <a:extLst>
-                <a:ext uri="{FF2B5EF4-FFF2-40B4-BE49-F238E27FC236}">
-                  <a16:creationId xmlns:a16="http://schemas.microsoft.com/office/drawing/2014/main" id="{A668B1B6-0E02-4CFE-901A-F10886A66A0B}"/>
-                </a:ext>
-              </a:extLst>
-            </p:cNvPr>
+            <p:cNvPr id="9" name="组合 8"/>
             <p:cNvGrpSpPr/>
             <p:nvPr/>
           </p:nvGrpSpPr>
           <p:grpSpPr>
             <a:xfrm>
-              <a:off x="2465226" y="4271570"/>
+              <a:off x="2953541" y="4271570"/>
               <a:ext cx="748923" cy="509782"/>
-              <a:chOff x="2373786" y="4225850"/>
+              <a:chOff x="2862101" y="4225850"/>
               <a:chExt cx="748923" cy="509782"/>
             </a:xfrm>
           </p:grpSpPr>
           <p:sp>
             <p:nvSpPr>
-              <p:cNvPr id="7" name="上箭头 37">
-                <a:extLst>
-                  <a:ext uri="{FF2B5EF4-FFF2-40B4-BE49-F238E27FC236}">
-                    <a16:creationId xmlns:a16="http://schemas.microsoft.com/office/drawing/2014/main" id="{55D0660C-4ACC-49D5-AEBA-E86D36EE3F21}"/>
-                  </a:ext>
-                </a:extLst>
-              </p:cNvPr>
+              <p:cNvPr id="7" name="上箭头 37"/>
               <p:cNvSpPr/>
               <p:nvPr/>
             </p:nvSpPr>
             <p:spPr>
               <a:xfrm rot="10800000">
-                <a:off x="2725387" y="4403123"/>
+                <a:off x="3213702" y="4403123"/>
                 <a:ext cx="45719" cy="332509"/>
               </a:xfrm>
               <a:prstGeom prst="upArrow">
                 <a:avLst/>
               </a:prstGeom>
-              <a:solidFill>
-                <a:srgbClr val="FF0000"/>
-              </a:solidFill>
+              <a:noFill/>
               <a:ln>
                 <a:solidFill>
                   <a:srgbClr val="FF0000"/>
                 </a:solidFill>
               </a:ln>
+              <a:extLst>
+                <a:ext uri="{909E8E84-426E-40DD-AFC4-6F175D3DCCD1}">
+                  <a14:hiddenFill xmlns:a14="http://schemas.microsoft.com/office/drawing/2010/main">
+                    <a:solidFill>
+                      <a:schemeClr val="accent2"/>
+                    </a:solidFill>
+                  </a14:hiddenFill>
+                </a:ext>
+              </a:extLst>
             </p:spPr>
             <p:style>
               <a:lnRef idx="2">
@@ -4248,25 +4193,28 @@
           </p:sp>
           <p:sp>
             <p:nvSpPr>
-              <p:cNvPr id="8" name="文本框 7">
-                <a:extLst>
-                  <a:ext uri="{FF2B5EF4-FFF2-40B4-BE49-F238E27FC236}">
-                    <a16:creationId xmlns:a16="http://schemas.microsoft.com/office/drawing/2014/main" id="{89816B97-F856-40B1-9767-5F98B69B3799}"/>
-                  </a:ext>
-                </a:extLst>
-              </p:cNvPr>
+              <p:cNvPr id="8" name="文本框 7"/>
               <p:cNvSpPr txBox="1"/>
               <p:nvPr/>
             </p:nvSpPr>
             <p:spPr>
               <a:xfrm>
-                <a:off x="2373786" y="4225850"/>
+                <a:off x="2862101" y="4225850"/>
                 <a:ext cx="748923" cy="215444"/>
               </a:xfrm>
               <a:prstGeom prst="rect">
                 <a:avLst/>
               </a:prstGeom>
               <a:noFill/>
+              <a:extLst>
+                <a:ext uri="{909E8E84-426E-40DD-AFC4-6F175D3DCCD1}">
+                  <a14:hiddenFill xmlns:a14="http://schemas.microsoft.com/office/drawing/2010/main">
+                    <a:solidFill>
+                      <a:schemeClr val="accent2"/>
+                    </a:solidFill>
+                  </a14:hiddenFill>
+                </a:ext>
+              </a:extLst>
             </p:spPr>
             <p:txBody>
               <a:bodyPr wrap="none" rtlCol="0">
@@ -4293,11 +4241,6 @@
         </p:grpSp>
       </p:grpSp>
     </p:spTree>
-    <p:extLst>
-      <p:ext uri="{BB962C8B-B14F-4D97-AF65-F5344CB8AC3E}">
-        <p14:creationId xmlns:p14="http://schemas.microsoft.com/office/powerpoint/2010/main" val="2842338554"/>
-      </p:ext>
-    </p:extLst>
   </p:cSld>
   <p:clrMapOvr>
     <a:masterClrMapping/>
@@ -4306,7 +4249,7 @@
 </file>
 
 <file path=ppt/tags/tag1.xml><?xml version="1.0" encoding="utf-8"?>
-<p:tagLst xmlns:a="http://schemas.openxmlformats.org/drawingml/2006/main" xmlns:r="http://schemas.openxmlformats.org/officeDocument/2006/relationships" xmlns:p="http://schemas.openxmlformats.org/presentationml/2006/main">
+<p:tagLst xmlns:p="http://schemas.openxmlformats.org/presentationml/2006/main">
   <p:tag name="OPFI" val=""/>
 </p:tagLst>
 </file>
@@ -4354,7 +4297,7 @@
     </a:clrScheme>
     <a:fontScheme name="Office">
       <a:majorFont>
-        <a:latin typeface="等线 Light" panose="020F0302020204030204"/>
+        <a:latin typeface="等线 Light"/>
         <a:ea typeface=""/>
         <a:cs typeface=""/>
         <a:font script="Jpan" typeface="游ゴシック Light"/>
@@ -4389,7 +4332,7 @@
         <a:font script="Geor" typeface="Sylfaen"/>
       </a:majorFont>
       <a:minorFont>
-        <a:latin typeface="等线" panose="020F0502020204030204"/>
+        <a:latin typeface="等线"/>
         <a:ea typeface=""/>
         <a:cs typeface=""/>
         <a:font script="Jpan" typeface="游ゴシック"/>
@@ -4562,8 +4505,6 @@
       </a:bgFillStyleLst>
     </a:fmtScheme>
   </a:themeElements>
-  <a:objectDefaults/>
-  <a:extraClrSchemeLst/>
   <a:extLst>
     <a:ext uri="{05A4C25C-085E-4340-85A3-A5531E510DB2}">
       <thm15:themeFamily xmlns:thm15="http://schemas.microsoft.com/office/thememl/2012/main" name="Office Theme" id="{62F939B6-93AF-4DB8-9C6B-D6C7DFDC589F}" vid="{4A3C46E8-61CC-4603-A589-7422A47A8E4A}"/>

</xml_diff>